<commit_message>
Wrote chapter 4 + half chapter 5, first drafts
</commit_message>
<xml_diff>
--- a/Figures/ConstructorSpecialisationData.pptx
+++ b/Figures/ConstructorSpecialisationData.pptx
@@ -288,7 +288,7 @@
           <a:p>
             <a:fld id="{47B9A199-D001-9B4E-B758-14EC809AFE55}" type="datetimeFigureOut">
               <a:rPr lang="da-DK" smtClean="0"/>
-              <a:t>26/07/14</a:t>
+              <a:t>05/08/14</a:t>
             </a:fld>
             <a:endParaRPr lang="en-GB"/>
           </a:p>
@@ -458,7 +458,7 @@
           <a:p>
             <a:fld id="{47B9A199-D001-9B4E-B758-14EC809AFE55}" type="datetimeFigureOut">
               <a:rPr lang="da-DK" smtClean="0"/>
-              <a:t>26/07/14</a:t>
+              <a:t>05/08/14</a:t>
             </a:fld>
             <a:endParaRPr lang="en-GB"/>
           </a:p>
@@ -638,7 +638,7 @@
           <a:p>
             <a:fld id="{47B9A199-D001-9B4E-B758-14EC809AFE55}" type="datetimeFigureOut">
               <a:rPr lang="da-DK" smtClean="0"/>
-              <a:t>26/07/14</a:t>
+              <a:t>05/08/14</a:t>
             </a:fld>
             <a:endParaRPr lang="en-GB"/>
           </a:p>
@@ -808,7 +808,7 @@
           <a:p>
             <a:fld id="{47B9A199-D001-9B4E-B758-14EC809AFE55}" type="datetimeFigureOut">
               <a:rPr lang="da-DK" smtClean="0"/>
-              <a:t>26/07/14</a:t>
+              <a:t>05/08/14</a:t>
             </a:fld>
             <a:endParaRPr lang="en-GB"/>
           </a:p>
@@ -1054,7 +1054,7 @@
           <a:p>
             <a:fld id="{47B9A199-D001-9B4E-B758-14EC809AFE55}" type="datetimeFigureOut">
               <a:rPr lang="da-DK" smtClean="0"/>
-              <a:t>26/07/14</a:t>
+              <a:t>05/08/14</a:t>
             </a:fld>
             <a:endParaRPr lang="en-GB"/>
           </a:p>
@@ -1342,7 +1342,7 @@
           <a:p>
             <a:fld id="{47B9A199-D001-9B4E-B758-14EC809AFE55}" type="datetimeFigureOut">
               <a:rPr lang="da-DK" smtClean="0"/>
-              <a:t>26/07/14</a:t>
+              <a:t>05/08/14</a:t>
             </a:fld>
             <a:endParaRPr lang="en-GB"/>
           </a:p>
@@ -1764,7 +1764,7 @@
           <a:p>
             <a:fld id="{47B9A199-D001-9B4E-B758-14EC809AFE55}" type="datetimeFigureOut">
               <a:rPr lang="da-DK" smtClean="0"/>
-              <a:t>26/07/14</a:t>
+              <a:t>05/08/14</a:t>
             </a:fld>
             <a:endParaRPr lang="en-GB"/>
           </a:p>
@@ -1882,7 +1882,7 @@
           <a:p>
             <a:fld id="{47B9A199-D001-9B4E-B758-14EC809AFE55}" type="datetimeFigureOut">
               <a:rPr lang="da-DK" smtClean="0"/>
-              <a:t>26/07/14</a:t>
+              <a:t>05/08/14</a:t>
             </a:fld>
             <a:endParaRPr lang="en-GB"/>
           </a:p>
@@ -1977,7 +1977,7 @@
           <a:p>
             <a:fld id="{47B9A199-D001-9B4E-B758-14EC809AFE55}" type="datetimeFigureOut">
               <a:rPr lang="da-DK" smtClean="0"/>
-              <a:t>26/07/14</a:t>
+              <a:t>05/08/14</a:t>
             </a:fld>
             <a:endParaRPr lang="en-GB"/>
           </a:p>
@@ -2254,7 +2254,7 @@
           <a:p>
             <a:fld id="{47B9A199-D001-9B4E-B758-14EC809AFE55}" type="datetimeFigureOut">
               <a:rPr lang="da-DK" smtClean="0"/>
-              <a:t>26/07/14</a:t>
+              <a:t>05/08/14</a:t>
             </a:fld>
             <a:endParaRPr lang="en-GB"/>
           </a:p>
@@ -2507,7 +2507,7 @@
           <a:p>
             <a:fld id="{47B9A199-D001-9B4E-B758-14EC809AFE55}" type="datetimeFigureOut">
               <a:rPr lang="da-DK" smtClean="0"/>
-              <a:t>26/07/14</a:t>
+              <a:t>05/08/14</a:t>
             </a:fld>
             <a:endParaRPr lang="en-GB"/>
           </a:p>
@@ -2720,7 +2720,7 @@
           <a:p>
             <a:fld id="{47B9A199-D001-9B4E-B758-14EC809AFE55}" type="datetimeFigureOut">
               <a:rPr lang="da-DK" smtClean="0"/>
-              <a:t>26/07/14</a:t>
+              <a:t>05/08/14</a:t>
             </a:fld>
             <a:endParaRPr lang="en-GB"/>
           </a:p>
@@ -3340,6 +3340,13 @@
             </a:r>
             <a:r>
               <a:rPr lang="en-US" sz="2400" dirty="0" smtClean="0">
+                <a:latin typeface="Lucida Console"/>
+                <a:cs typeface="Lucida Console"/>
+              </a:rPr>
+              <a:t>(</a:t>
+            </a:r>
+            <a:r>
+              <a:rPr lang="en-US" sz="2400" dirty="0" smtClean="0">
                 <a:solidFill>
                   <a:schemeClr val="accent3"/>
                 </a:solidFill>
@@ -3359,15 +3366,52 @@
                 <a:latin typeface="Lucida Console"/>
                 <a:cs typeface="Lucida Console"/>
               </a:rPr>
-              <a:t>name age </a:t>
+              <a:t>name </a:t>
+            </a:r>
+            <a:r>
+              <a:rPr lang="en-US" sz="2400" dirty="0" smtClean="0">
+                <a:solidFill>
+                  <a:schemeClr val="accent2">
+                    <a:lumMod val="40000"/>
+                    <a:lumOff val="60000"/>
+                  </a:schemeClr>
+                </a:solidFill>
+                <a:latin typeface="Lucida Console"/>
+                <a:cs typeface="Lucida Console"/>
+              </a:rPr>
+              <a:t>age</a:t>
             </a:r>
             <a:r>
               <a:rPr lang="en-US" sz="2400" dirty="0">
                 <a:latin typeface="Lucida Console"/>
                 <a:cs typeface="Lucida Console"/>
               </a:rPr>
+              <a:t>)</a:t>
+            </a:r>
+            <a:r>
+              <a:rPr lang="en-US" sz="2400" dirty="0" smtClean="0">
+                <a:solidFill>
+                  <a:schemeClr val="accent2">
+                    <a:lumMod val="40000"/>
+                    <a:lumOff val="60000"/>
+                  </a:schemeClr>
+                </a:solidFill>
+                <a:latin typeface="Lucida Console"/>
+                <a:cs typeface="Lucida Console"/>
+              </a:rPr>
+              <a:t> </a:t>
+            </a:r>
+            <a:r>
+              <a:rPr lang="en-US" sz="2400" dirty="0" smtClean="0">
+                <a:latin typeface="Lucida Console"/>
+                <a:cs typeface="Lucida Console"/>
+              </a:rPr>
               <a:t>=</a:t>
             </a:r>
+            <a:endParaRPr lang="en-US" sz="2400" dirty="0">
+              <a:latin typeface="Lucida Console"/>
+              <a:cs typeface="Lucida Console"/>
+            </a:endParaRPr>
           </a:p>
           <a:p>
             <a:r>
@@ -3555,7 +3599,7 @@
           </a:p>
           <a:p>
             <a:r>
-              <a:rPr lang="en-US" sz="2400" dirty="0">
+              <a:rPr lang="en-US" sz="2400">
                 <a:solidFill>
                   <a:srgbClr val="C0504D"/>
                 </a:solidFill>
@@ -3565,7 +3609,7 @@
               <a:t>s</a:t>
             </a:r>
             <a:r>
-              <a:rPr lang="en-US" sz="2400" dirty="0" smtClean="0">
+              <a:rPr lang="en-US" sz="2400" smtClean="0">
                 <a:solidFill>
                   <a:srgbClr val="C0504D"/>
                 </a:solidFill>
@@ -3575,14 +3619,21 @@
               <a:t>erialize</a:t>
             </a:r>
             <a:r>
-              <a:rPr lang="en-US" sz="2400" dirty="0" smtClean="0">
+              <a:rPr lang="en-US" sz="2400" smtClean="0">
                 <a:latin typeface="Lucida Console"/>
                 <a:cs typeface="Lucida Console"/>
               </a:rPr>
               <a:t> </a:t>
             </a:r>
             <a:r>
-              <a:rPr lang="en-US" sz="2400" dirty="0" smtClean="0">
+              <a:rPr lang="en-US" sz="2400" smtClean="0">
+                <a:latin typeface="Lucida Console"/>
+                <a:cs typeface="Lucida Console"/>
+              </a:rPr>
+              <a:t>(</a:t>
+            </a:r>
+            <a:r>
+              <a:rPr lang="en-US" sz="2400" smtClean="0">
                 <a:solidFill>
                   <a:srgbClr val="9BBB59"/>
                 </a:solidFill>
@@ -3592,14 +3643,14 @@
               <a:t>Department</a:t>
             </a:r>
             <a:r>
-              <a:rPr lang="en-US" sz="2400" dirty="0" smtClean="0">
+              <a:rPr lang="en-US" sz="2400" smtClean="0">
                 <a:latin typeface="Lucida Console"/>
                 <a:cs typeface="Lucida Console"/>
               </a:rPr>
               <a:t> </a:t>
             </a:r>
             <a:r>
-              <a:rPr lang="en-US" sz="2400" dirty="0" smtClean="0">
+              <a:rPr lang="en-US" sz="2400" smtClean="0">
                 <a:solidFill>
                   <a:srgbClr val="D99694"/>
                 </a:solidFill>
@@ -3609,7 +3660,14 @@
               <a:t>department</a:t>
             </a:r>
             <a:r>
-              <a:rPr lang="en-US" sz="2400" dirty="0" smtClean="0">
+              <a:rPr lang="en-US" sz="2400">
+                <a:latin typeface="Lucida Console"/>
+                <a:cs typeface="Lucida Console"/>
+              </a:rPr>
+              <a:t>)</a:t>
+            </a:r>
+            <a:r>
+              <a:rPr lang="en-US" sz="2400" smtClean="0">
                 <a:solidFill>
                   <a:srgbClr val="9BBB59"/>
                 </a:solidFill>

</xml_diff>